<commit_message>
Update formatting slides/java/Giới thiệu về Java - Bài 1.pptx
</commit_message>
<xml_diff>
--- a/documents/slides/java/Giới thiệu về Java - Bài 1.pptx
+++ b/documents/slides/java/Giới thiệu về Java - Bài 1.pptx
@@ -120,6 +120,11 @@
       </a:defRPr>
     </a:lvl9pPr>
   </p:defaultTextStyle>
+  <p:extLst>
+    <p:ext uri="{EFAFB233-063F-42B5-8137-9DF3F51BA10A}">
+      <p15:sldGuideLst xmlns:p15="http://schemas.microsoft.com/office/powerpoint/2012/main"/>
+    </p:ext>
+  </p:extLst>
 </p:presentation>
 </file>
 
@@ -8996,7 +9001,6 @@
               <a:rPr lang="en-US" i="1" dirty="0" smtClean="0"/>
               <a:t>----</a:t>
             </a:r>
-            <a:endParaRPr lang="en-US" i="1" dirty="0" smtClean="0"/>
           </a:p>
           <a:p>
             <a:pPr marL="0" indent="0">
@@ -9359,7 +9363,7 @@
         </p:spPr>
         <p:txBody>
           <a:bodyPr>
-            <a:normAutofit/>
+            <a:normAutofit lnSpcReduction="10000"/>
           </a:bodyPr>
           <a:lstStyle/>
           <a:p>
@@ -9432,9 +9436,6 @@
             </a:r>
           </a:p>
           <a:p>
-            <a:pPr marL="0" indent="0">
-              <a:buNone/>
-            </a:pPr>
             <a:r>
               <a:rPr lang="en-US" dirty="0" err="1" smtClean="0"/>
               <a:t>Mỗi</a:t>
@@ -9709,16 +9710,21 @@
             </a:r>
           </a:p>
           <a:p>
-            <a:pPr marL="0" indent="0">
-              <a:buNone/>
-            </a:pPr>
             <a:r>
               <a:rPr lang="en-US" dirty="0" err="1" smtClean="0"/>
               <a:t>Hàm</a:t>
             </a:r>
             <a:r>
               <a:rPr lang="en-US" dirty="0" smtClean="0"/>
-              <a:t> main </a:t>
+              <a:t> </a:t>
+            </a:r>
+            <a:r>
+              <a:rPr lang="en-US" b="1" i="1" dirty="0" smtClean="0"/>
+              <a:t>main</a:t>
+            </a:r>
+            <a:r>
+              <a:rPr lang="en-US" dirty="0" smtClean="0"/>
+              <a:t> </a:t>
             </a:r>
             <a:r>
               <a:rPr lang="en-US" dirty="0" err="1" smtClean="0"/>
@@ -9799,9 +9805,6 @@
             <a:endParaRPr lang="en-US" dirty="0" smtClean="0"/>
           </a:p>
           <a:p>
-            <a:pPr marL="0" indent="0">
-              <a:buNone/>
-            </a:pPr>
             <a:r>
               <a:rPr lang="en-US" dirty="0" err="1" smtClean="0"/>
               <a:t>Nội</a:t>
@@ -9889,9 +9892,6 @@
             <a:endParaRPr lang="en-US" dirty="0" smtClean="0"/>
           </a:p>
           <a:p>
-            <a:pPr marL="0" indent="0">
-              <a:buNone/>
-            </a:pPr>
             <a:r>
               <a:rPr lang="en-US" dirty="0" err="1" smtClean="0"/>
               <a:t>Các</a:t>
@@ -9914,7 +9914,15 @@
             </a:r>
             <a:r>
               <a:rPr lang="en-US" dirty="0" smtClean="0"/>
-              <a:t> public </a:t>
+              <a:t> </a:t>
+            </a:r>
+            <a:r>
+              <a:rPr lang="en-US" b="1" i="1" dirty="0" smtClean="0"/>
+              <a:t>public, private</a:t>
+            </a:r>
+            <a:r>
+              <a:rPr lang="en-US" dirty="0" smtClean="0"/>
+              <a:t> </a:t>
             </a:r>
             <a:r>
               <a:rPr lang="en-US" dirty="0" err="1" smtClean="0"/>
@@ -10003,9 +10011,6 @@
             <a:endParaRPr lang="en-US" dirty="0" smtClean="0"/>
           </a:p>
           <a:p>
-            <a:pPr marL="0" indent="0">
-              <a:buNone/>
-            </a:pPr>
             <a:r>
               <a:rPr lang="en-US" dirty="0" err="1" smtClean="0"/>
               <a:t>Hàm</a:t>

</xml_diff>